<commit_message>
Fix issues #161 and #163
- Increase contrast for Architecture Diagram.
- Emphasise date limits of `visualize` in UG.
</commit_message>
<xml_diff>
--- a/docs/diagrams/powerpoint/ArchitectureDiagram.pptx
+++ b/docs/diagrams/powerpoint/ArchitectureDiagram.pptx
@@ -244,7 +244,7 @@
             <a:fld id="{11A6662E-FAF4-44BC-88B5-85A7CBFB6D30}" type="datetime1">
               <a:rPr lang="en-US" smtClean="0"/>
               <a:pPr/>
-              <a:t>11/6/2024</a:t>
+              <a:t>11/10/2024</a:t>
             </a:fld>
             <a:endParaRPr lang="en-US" dirty="0"/>
           </a:p>
@@ -421,7 +421,7 @@
           <a:p>
             <a:fld id="{4C559632-1575-4E14-B53B-3DC3D5ED3947}" type="datetime1">
               <a:rPr lang="en-US" smtClean="0"/>
-              <a:t>11/6/2024</a:t>
+              <a:t>11/10/2024</a:t>
             </a:fld>
             <a:endParaRPr lang="en-US"/>
           </a:p>
@@ -601,7 +601,7 @@
           <a:p>
             <a:fld id="{CC4A6868-2568-4CC9-B302-F37117B01A6E}" type="datetime1">
               <a:rPr lang="en-US" smtClean="0"/>
-              <a:t>11/6/2024</a:t>
+              <a:t>11/10/2024</a:t>
             </a:fld>
             <a:endParaRPr lang="en-US"/>
           </a:p>
@@ -771,7 +771,7 @@
           <a:p>
             <a:fld id="{0055F08A-1E71-4B2B-BB49-E743F2903911}" type="datetime1">
               <a:rPr lang="en-US" smtClean="0"/>
-              <a:t>11/6/2024</a:t>
+              <a:t>11/10/2024</a:t>
             </a:fld>
             <a:endParaRPr lang="en-US" dirty="0"/>
           </a:p>
@@ -1017,7 +1017,7 @@
           <a:p>
             <a:fld id="{15417D9E-721A-44BB-8863-9873FE64DA75}" type="datetime1">
               <a:rPr lang="en-US" smtClean="0"/>
-              <a:t>11/6/2024</a:t>
+              <a:t>11/10/2024</a:t>
             </a:fld>
             <a:endParaRPr lang="en-US"/>
           </a:p>
@@ -1249,7 +1249,7 @@
           <a:p>
             <a:fld id="{5F31DA2F-80B8-49CF-99FB-5ABCA53A607A}" type="datetime1">
               <a:rPr lang="en-US" smtClean="0"/>
-              <a:t>11/6/2024</a:t>
+              <a:t>11/10/2024</a:t>
             </a:fld>
             <a:endParaRPr lang="en-US"/>
           </a:p>
@@ -1616,7 +1616,7 @@
           <a:p>
             <a:fld id="{28852172-E6C9-4B6C-929A-A9DE3837BBF1}" type="datetime1">
               <a:rPr lang="en-US" smtClean="0"/>
-              <a:t>11/6/2024</a:t>
+              <a:t>11/10/2024</a:t>
             </a:fld>
             <a:endParaRPr lang="en-US"/>
           </a:p>
@@ -1734,7 +1734,7 @@
           <a:p>
             <a:fld id="{3AB41CFF-90C9-47B3-9DA1-F2BF8D839F7E}" type="datetime1">
               <a:rPr lang="en-US" smtClean="0"/>
-              <a:t>11/6/2024</a:t>
+              <a:t>11/10/2024</a:t>
             </a:fld>
             <a:endParaRPr lang="en-US"/>
           </a:p>
@@ -1829,7 +1829,7 @@
           <a:p>
             <a:fld id="{F06048FA-06AB-4884-A69B-986B96E68A24}" type="datetime1">
               <a:rPr lang="en-US" smtClean="0"/>
-              <a:t>11/6/2024</a:t>
+              <a:t>11/10/2024</a:t>
             </a:fld>
             <a:endParaRPr lang="en-US"/>
           </a:p>
@@ -2106,7 +2106,7 @@
           <a:p>
             <a:fld id="{50DB7ABA-0172-4F9C-889D-567164F66BCD}" type="datetime1">
               <a:rPr lang="en-US" smtClean="0"/>
-              <a:t>11/6/2024</a:t>
+              <a:t>11/10/2024</a:t>
             </a:fld>
             <a:endParaRPr lang="en-US"/>
           </a:p>
@@ -2363,7 +2363,7 @@
           <a:p>
             <a:fld id="{78AC6A5B-8AE7-4A41-B5A7-9ADC6686DC18}" type="datetime1">
               <a:rPr lang="en-US" smtClean="0"/>
-              <a:t>11/6/2024</a:t>
+              <a:t>11/10/2024</a:t>
             </a:fld>
             <a:endParaRPr lang="en-US"/>
           </a:p>
@@ -2577,7 +2577,7 @@
             <a:fld id="{57E0CF6C-748E-4B7A-BC8B-3011EF78ED13}" type="datetime1">
               <a:rPr lang="en-US" smtClean="0"/>
               <a:pPr/>
-              <a:t>11/6/2024</a:t>
+              <a:t>11/10/2024</a:t>
             </a:fld>
             <a:endParaRPr lang="en-US" dirty="0"/>
           </a:p>
@@ -3013,7 +3013,7 @@
         <p:spPr>
           <a:xfrm>
             <a:off x="340029" y="812741"/>
-            <a:ext cx="5132481" cy="3972619"/>
+            <a:ext cx="5132481" cy="4025266"/>
           </a:xfrm>
           <a:prstGeom prst="rect">
             <a:avLst/>
@@ -3072,7 +3072,7 @@
         <p:spPr>
           <a:xfrm>
             <a:off x="2430553" y="2714773"/>
-            <a:ext cx="2914928" cy="1934121"/>
+            <a:ext cx="2914928" cy="2002005"/>
           </a:xfrm>
           <a:prstGeom prst="rect">
             <a:avLst/>
@@ -3081,7 +3081,7 @@
             <a:schemeClr val="accent1">
               <a:lumMod val="20000"/>
               <a:lumOff val="80000"/>
-              <a:alpha val="24000"/>
+              <a:alpha val="9000"/>
             </a:schemeClr>
           </a:solidFill>
           <a:ln w="19050">
@@ -3115,10 +3115,7 @@
             <a:r>
               <a:rPr lang="en-US" sz="960" dirty="0">
                 <a:solidFill>
-                  <a:schemeClr val="tx2">
-                    <a:lumMod val="90000"/>
-                    <a:lumOff val="10000"/>
-                  </a:schemeClr>
+                  <a:srgbClr val="102D48"/>
                 </a:solidFill>
                 <a:latin typeface="Aptos" panose="020B0004020202020204" pitchFamily="34" charset="0"/>
               </a:rPr>
@@ -3126,10 +3123,7 @@
             </a:r>
             <a:endParaRPr lang="vi-VN" sz="560" dirty="0">
               <a:solidFill>
-                <a:schemeClr val="tx2">
-                  <a:lumMod val="90000"/>
-                  <a:lumOff val="10000"/>
-                </a:schemeClr>
+                <a:srgbClr val="102D48"/>
               </a:solidFill>
               <a:latin typeface="Aptos" panose="020B0004020202020204" pitchFamily="34" charset="0"/>
             </a:endParaRPr>
@@ -4198,8 +4192,8 @@
         </p:nvSpPr>
         <p:spPr>
           <a:xfrm>
-            <a:off x="2431263" y="2955053"/>
-            <a:ext cx="2914928" cy="1699946"/>
+            <a:off x="2431263" y="2997330"/>
+            <a:ext cx="2914928" cy="1719448"/>
           </a:xfrm>
           <a:prstGeom prst="rect">
             <a:avLst/>
@@ -4242,10 +4236,7 @@
             <a:r>
               <a:rPr lang="en-US" sz="960" dirty="0">
                 <a:solidFill>
-                  <a:schemeClr val="tx2">
-                    <a:lumMod val="90000"/>
-                    <a:lumOff val="10000"/>
-                  </a:schemeClr>
+                  <a:srgbClr val="102D48"/>
                 </a:solidFill>
                 <a:latin typeface="Aptos" panose="020B0004020202020204" pitchFamily="34" charset="0"/>
               </a:rPr>
@@ -4253,10 +4244,7 @@
             </a:r>
             <a:endParaRPr lang="vi-VN" sz="560" dirty="0">
               <a:solidFill>
-                <a:schemeClr val="tx2">
-                  <a:lumMod val="90000"/>
-                  <a:lumOff val="10000"/>
-                </a:schemeClr>
+                <a:srgbClr val="102D48"/>
               </a:solidFill>
               <a:latin typeface="Aptos" panose="020B0004020202020204" pitchFamily="34" charset="0"/>
             </a:endParaRPr>
@@ -4277,8 +4265,8 @@
         </p:nvSpPr>
         <p:spPr>
           <a:xfrm>
-            <a:off x="2550811" y="3232431"/>
-            <a:ext cx="841496" cy="306717"/>
+            <a:off x="2547001" y="3262911"/>
+            <a:ext cx="841496" cy="279295"/>
           </a:xfrm>
           <a:prstGeom prst="rect">
             <a:avLst/>
@@ -4287,10 +4275,10 @@
             <a:schemeClr val="accent1">
               <a:lumMod val="40000"/>
               <a:lumOff val="60000"/>
-              <a:alpha val="50000"/>
+              <a:alpha val="26000"/>
             </a:schemeClr>
           </a:solidFill>
-          <a:ln w="19050">
+          <a:ln w="15875">
             <a:solidFill>
               <a:schemeClr val="accent1">
                 <a:lumMod val="75000"/>
@@ -4320,10 +4308,7 @@
             <a:r>
               <a:rPr lang="en-US" sz="960" dirty="0" err="1">
                 <a:solidFill>
-                  <a:schemeClr val="tx2">
-                    <a:lumMod val="90000"/>
-                    <a:lumOff val="10000"/>
-                  </a:schemeClr>
+                  <a:srgbClr val="102D48"/>
                 </a:solidFill>
                 <a:latin typeface="Aptos" panose="020B0004020202020204" pitchFamily="34" charset="0"/>
               </a:rPr>
@@ -4331,10 +4316,7 @@
             </a:r>
             <a:endParaRPr lang="vi-VN" sz="560" dirty="0">
               <a:solidFill>
-                <a:schemeClr val="tx2">
-                  <a:lumMod val="90000"/>
-                  <a:lumOff val="10000"/>
-                </a:schemeClr>
+                <a:srgbClr val="102D48"/>
               </a:solidFill>
               <a:latin typeface="Aptos" panose="020B0004020202020204" pitchFamily="34" charset="0"/>
             </a:endParaRPr>
@@ -4355,8 +4337,8 @@
         </p:nvSpPr>
         <p:spPr>
           <a:xfrm>
-            <a:off x="3469482" y="3232431"/>
-            <a:ext cx="841496" cy="306717"/>
+            <a:off x="3465672" y="3262911"/>
+            <a:ext cx="841496" cy="279295"/>
           </a:xfrm>
           <a:prstGeom prst="rect">
             <a:avLst/>
@@ -4365,10 +4347,10 @@
             <a:schemeClr val="accent1">
               <a:lumMod val="40000"/>
               <a:lumOff val="60000"/>
-              <a:alpha val="50000"/>
+              <a:alpha val="26000"/>
             </a:schemeClr>
           </a:solidFill>
-          <a:ln w="19050">
+          <a:ln w="15875">
             <a:solidFill>
               <a:schemeClr val="accent1">
                 <a:lumMod val="75000"/>
@@ -4398,10 +4380,7 @@
             <a:r>
               <a:rPr lang="en-US" sz="960" dirty="0">
                 <a:solidFill>
-                  <a:schemeClr val="tx2">
-                    <a:lumMod val="90000"/>
-                    <a:lumOff val="10000"/>
-                  </a:schemeClr>
+                  <a:srgbClr val="102D48"/>
                 </a:solidFill>
                 <a:latin typeface="Aptos" panose="020B0004020202020204" pitchFamily="34" charset="0"/>
               </a:rPr>
@@ -4409,10 +4388,7 @@
             </a:r>
             <a:endParaRPr lang="vi-VN" sz="560" dirty="0">
               <a:solidFill>
-                <a:schemeClr val="tx2">
-                  <a:lumMod val="90000"/>
-                  <a:lumOff val="10000"/>
-                </a:schemeClr>
+                <a:srgbClr val="102D48"/>
               </a:solidFill>
               <a:latin typeface="Aptos" panose="020B0004020202020204" pitchFamily="34" charset="0"/>
             </a:endParaRPr>
@@ -4433,8 +4409,8 @@
         </p:nvSpPr>
         <p:spPr>
           <a:xfrm>
-            <a:off x="4388154" y="3232431"/>
-            <a:ext cx="841496" cy="306717"/>
+            <a:off x="4384344" y="3262911"/>
+            <a:ext cx="841496" cy="279295"/>
           </a:xfrm>
           <a:prstGeom prst="rect">
             <a:avLst/>
@@ -4443,10 +4419,10 @@
             <a:schemeClr val="accent1">
               <a:lumMod val="40000"/>
               <a:lumOff val="60000"/>
-              <a:alpha val="50000"/>
+              <a:alpha val="26000"/>
             </a:schemeClr>
           </a:solidFill>
-          <a:ln w="19050">
+          <a:ln w="15875">
             <a:solidFill>
               <a:schemeClr val="accent1">
                 <a:lumMod val="75000"/>
@@ -4476,10 +4452,7 @@
             <a:r>
               <a:rPr lang="en-US" sz="880" dirty="0" err="1">
                 <a:solidFill>
-                  <a:schemeClr val="tx2">
-                    <a:lumMod val="90000"/>
-                    <a:lumOff val="10000"/>
-                  </a:schemeClr>
+                  <a:srgbClr val="102D48"/>
                 </a:solidFill>
                 <a:latin typeface="Aptos" panose="020B0004020202020204" pitchFamily="34" charset="0"/>
               </a:rPr>
@@ -4487,10 +4460,7 @@
             </a:r>
             <a:endParaRPr lang="vi-VN" sz="880" dirty="0">
               <a:solidFill>
-                <a:schemeClr val="tx2">
-                  <a:lumMod val="90000"/>
-                  <a:lumOff val="10000"/>
-                </a:schemeClr>
+                <a:srgbClr val="102D48"/>
               </a:solidFill>
               <a:latin typeface="Aptos" panose="020B0004020202020204" pitchFamily="34" charset="0"/>
             </a:endParaRPr>
@@ -4511,8 +4481,8 @@
         </p:nvSpPr>
         <p:spPr>
           <a:xfrm>
-            <a:off x="2550810" y="3621005"/>
-            <a:ext cx="1301862" cy="306717"/>
+            <a:off x="2547000" y="3613385"/>
+            <a:ext cx="1301862" cy="279295"/>
           </a:xfrm>
           <a:prstGeom prst="rect">
             <a:avLst/>
@@ -4521,10 +4491,10 @@
             <a:schemeClr val="accent1">
               <a:lumMod val="40000"/>
               <a:lumOff val="60000"/>
-              <a:alpha val="50000"/>
+              <a:alpha val="26000"/>
             </a:schemeClr>
           </a:solidFill>
-          <a:ln w="19050">
+          <a:ln w="15875">
             <a:solidFill>
               <a:schemeClr val="accent1">
                 <a:lumMod val="75000"/>
@@ -4554,10 +4524,7 @@
             <a:r>
               <a:rPr lang="en-US" sz="960" dirty="0" err="1">
                 <a:solidFill>
-                  <a:schemeClr val="tx2">
-                    <a:lumMod val="90000"/>
-                    <a:lumOff val="10000"/>
-                  </a:schemeClr>
+                  <a:srgbClr val="102D48"/>
                 </a:solidFill>
                 <a:latin typeface="Aptos" panose="020B0004020202020204" pitchFamily="34" charset="0"/>
               </a:rPr>
@@ -4565,10 +4532,7 @@
             </a:r>
             <a:endParaRPr lang="vi-VN" sz="560" dirty="0">
               <a:solidFill>
-                <a:schemeClr val="tx2">
-                  <a:lumMod val="90000"/>
-                  <a:lumOff val="10000"/>
-                </a:schemeClr>
+                <a:srgbClr val="102D48"/>
               </a:solidFill>
               <a:latin typeface="Aptos" panose="020B0004020202020204" pitchFamily="34" charset="0"/>
             </a:endParaRPr>
@@ -4589,8 +4553,8 @@
         </p:nvSpPr>
         <p:spPr>
           <a:xfrm>
-            <a:off x="3927788" y="3621005"/>
-            <a:ext cx="1301862" cy="306717"/>
+            <a:off x="3923978" y="3613385"/>
+            <a:ext cx="1301862" cy="279295"/>
           </a:xfrm>
           <a:prstGeom prst="rect">
             <a:avLst/>
@@ -4599,10 +4563,10 @@
             <a:schemeClr val="accent1">
               <a:lumMod val="40000"/>
               <a:lumOff val="60000"/>
-              <a:alpha val="50000"/>
+              <a:alpha val="26000"/>
             </a:schemeClr>
           </a:solidFill>
-          <a:ln w="19050">
+          <a:ln w="15875">
             <a:solidFill>
               <a:schemeClr val="accent1">
                 <a:lumMod val="75000"/>
@@ -4632,10 +4596,7 @@
             <a:r>
               <a:rPr lang="en-US" sz="920" dirty="0" err="1">
                 <a:solidFill>
-                  <a:schemeClr val="tx2">
-                    <a:lumMod val="90000"/>
-                    <a:lumOff val="10000"/>
-                  </a:schemeClr>
+                  <a:srgbClr val="102D48"/>
                 </a:solidFill>
                 <a:latin typeface="Aptos" panose="020B0004020202020204" pitchFamily="34" charset="0"/>
               </a:rPr>
@@ -4643,270 +4604,228 @@
             </a:r>
             <a:endParaRPr lang="vi-VN" sz="920" dirty="0">
               <a:solidFill>
-                <a:schemeClr val="tx2">
-                  <a:lumMod val="90000"/>
-                  <a:lumOff val="10000"/>
-                </a:schemeClr>
+                <a:srgbClr val="102D48"/>
               </a:solidFill>
               <a:latin typeface="Aptos" panose="020B0004020202020204" pitchFamily="34" charset="0"/>
             </a:endParaRPr>
           </a:p>
         </p:txBody>
       </p:sp>
-      <p:grpSp>
-        <p:nvGrpSpPr>
-          <p:cNvPr id="49" name="Group 48">
+      <p:sp>
+        <p:nvSpPr>
+          <p:cNvPr id="42" name="Rectangle 41">
             <a:extLst>
               <a:ext uri="{FF2B5EF4-FFF2-40B4-BE49-F238E27FC236}">
-                <a16:creationId xmlns:a16="http://schemas.microsoft.com/office/drawing/2014/main" id="{E98D281D-744E-17D6-1B91-DBC17252A37A}"/>
+                <a16:creationId xmlns:a16="http://schemas.microsoft.com/office/drawing/2014/main" id="{C20984D0-9B85-7D1F-CE6D-195C294157BD}"/>
               </a:ext>
             </a:extLst>
           </p:cNvPr>
-          <p:cNvGrpSpPr/>
+          <p:cNvSpPr/>
           <p:nvPr/>
-        </p:nvGrpSpPr>
-        <p:grpSpPr>
+        </p:nvSpPr>
+        <p:spPr>
           <a:xfrm>
-            <a:off x="2431263" y="4030034"/>
-            <a:ext cx="2914928" cy="624968"/>
-            <a:chOff x="3029370" y="5037542"/>
-            <a:chExt cx="3653369" cy="936000"/>
-          </a:xfrm>
-        </p:grpSpPr>
-        <p:sp>
-          <p:nvSpPr>
-            <p:cNvPr id="42" name="Rectangle 41">
-              <a:extLst>
-                <a:ext uri="{FF2B5EF4-FFF2-40B4-BE49-F238E27FC236}">
-                  <a16:creationId xmlns:a16="http://schemas.microsoft.com/office/drawing/2014/main" id="{C20984D0-9B85-7D1F-CE6D-195C294157BD}"/>
-                </a:ext>
-              </a:extLst>
-            </p:cNvPr>
-            <p:cNvSpPr/>
-            <p:nvPr/>
-          </p:nvSpPr>
-          <p:spPr>
-            <a:xfrm>
-              <a:off x="3029370" y="5037542"/>
-              <a:ext cx="3653369" cy="936000"/>
-            </a:xfrm>
-            <a:prstGeom prst="rect">
-              <a:avLst/>
-            </a:prstGeom>
+            <a:off x="2558008" y="4015440"/>
+            <a:ext cx="2667832" cy="582640"/>
+          </a:xfrm>
+          <a:prstGeom prst="rect">
+            <a:avLst/>
+          </a:prstGeom>
+          <a:solidFill>
+            <a:srgbClr val="85B2E9">
+              <a:alpha val="37000"/>
+            </a:srgbClr>
+          </a:solidFill>
+          <a:ln w="19050">
             <a:solidFill>
-              <a:srgbClr val="85B2E9">
-                <a:alpha val="23922"/>
-              </a:srgbClr>
+              <a:schemeClr val="accent1">
+                <a:lumMod val="75000"/>
+                <a:alpha val="42000"/>
+              </a:schemeClr>
             </a:solidFill>
-            <a:ln w="19050">
-              <a:solidFill>
-                <a:schemeClr val="accent1">
-                  <a:lumMod val="75000"/>
-                  <a:alpha val="42000"/>
-                </a:schemeClr>
-              </a:solidFill>
-            </a:ln>
-          </p:spPr>
-          <p:style>
-            <a:lnRef idx="0">
-              <a:scrgbClr r="0" g="0" b="0"/>
-            </a:lnRef>
-            <a:fillRef idx="0">
-              <a:scrgbClr r="0" g="0" b="0"/>
-            </a:fillRef>
-            <a:effectRef idx="0">
-              <a:scrgbClr r="0" g="0" b="0"/>
-            </a:effectRef>
-            <a:fontRef idx="minor">
-              <a:schemeClr val="lt1"/>
-            </a:fontRef>
-          </p:style>
-          <p:txBody>
-            <a:bodyPr tIns="48960" rtlCol="0" anchor="t" anchorCtr="0"/>
-            <a:lstStyle/>
-            <a:p>
-              <a:pPr algn="ctr"/>
-              <a:r>
-                <a:rPr lang="en-US" sz="960" dirty="0" err="1">
-                  <a:solidFill>
-                    <a:schemeClr val="tx2">
-                      <a:lumMod val="90000"/>
-                      <a:lumOff val="10000"/>
-                    </a:schemeClr>
-                  </a:solidFill>
-                  <a:latin typeface="Aptos" panose="020B0004020202020204" pitchFamily="34" charset="0"/>
-                </a:rPr>
-                <a:t>expense_operations</a:t>
-              </a:r>
-              <a:endParaRPr lang="vi-VN" sz="560" dirty="0">
+          </a:ln>
+        </p:spPr>
+        <p:style>
+          <a:lnRef idx="0">
+            <a:scrgbClr r="0" g="0" b="0"/>
+          </a:lnRef>
+          <a:fillRef idx="0">
+            <a:scrgbClr r="0" g="0" b="0"/>
+          </a:fillRef>
+          <a:effectRef idx="0">
+            <a:scrgbClr r="0" g="0" b="0"/>
+          </a:effectRef>
+          <a:fontRef idx="minor">
+            <a:schemeClr val="lt1"/>
+          </a:fontRef>
+        </p:style>
+        <p:txBody>
+          <a:bodyPr tIns="48960" rtlCol="0" anchor="t" anchorCtr="0"/>
+          <a:lstStyle/>
+          <a:p>
+            <a:pPr algn="ctr"/>
+            <a:r>
+              <a:rPr lang="en-US" sz="960" dirty="0" err="1">
                 <a:solidFill>
-                  <a:schemeClr val="tx2">
-                    <a:lumMod val="90000"/>
-                    <a:lumOff val="10000"/>
-                  </a:schemeClr>
+                  <a:srgbClr val="102D48"/>
                 </a:solidFill>
                 <a:latin typeface="Aptos" panose="020B0004020202020204" pitchFamily="34" charset="0"/>
-              </a:endParaRPr>
-            </a:p>
-          </p:txBody>
-        </p:sp>
-        <p:sp>
-          <p:nvSpPr>
-            <p:cNvPr id="45" name="Rectangle 44">
-              <a:extLst>
-                <a:ext uri="{FF2B5EF4-FFF2-40B4-BE49-F238E27FC236}">
-                  <a16:creationId xmlns:a16="http://schemas.microsoft.com/office/drawing/2014/main" id="{EEDB3748-DC3C-E284-8313-31953C8738AB}"/>
-                </a:ext>
-              </a:extLst>
-            </p:cNvPr>
-            <p:cNvSpPr/>
-            <p:nvPr/>
-          </p:nvSpPr>
-          <p:spPr>
-            <a:xfrm>
-              <a:off x="3188512" y="5360945"/>
-              <a:ext cx="1627328" cy="459363"/>
-            </a:xfrm>
-            <a:prstGeom prst="rect">
-              <a:avLst/>
-            </a:prstGeom>
+              </a:rPr>
+              <a:t>expense_operations</a:t>
+            </a:r>
+            <a:endParaRPr lang="vi-VN" sz="560" dirty="0">
+              <a:solidFill>
+                <a:srgbClr val="102D48"/>
+              </a:solidFill>
+              <a:latin typeface="Aptos" panose="020B0004020202020204" pitchFamily="34" charset="0"/>
+            </a:endParaRPr>
+          </a:p>
+        </p:txBody>
+      </p:sp>
+      <p:sp>
+        <p:nvSpPr>
+          <p:cNvPr id="45" name="Rectangle 44">
+            <a:extLst>
+              <a:ext uri="{FF2B5EF4-FFF2-40B4-BE49-F238E27FC236}">
+                <a16:creationId xmlns:a16="http://schemas.microsoft.com/office/drawing/2014/main" id="{EEDB3748-DC3C-E284-8313-31953C8738AB}"/>
+              </a:ext>
+            </a:extLst>
+          </p:cNvPr>
+          <p:cNvSpPr/>
+          <p:nvPr/>
+        </p:nvSpPr>
+        <p:spPr>
+          <a:xfrm>
+            <a:off x="2699802" y="4259871"/>
+            <a:ext cx="1149060" cy="254413"/>
+          </a:xfrm>
+          <a:prstGeom prst="rect">
+            <a:avLst/>
+          </a:prstGeom>
+          <a:solidFill>
+            <a:schemeClr val="accent1">
+              <a:lumMod val="40000"/>
+              <a:lumOff val="60000"/>
+              <a:alpha val="26000"/>
+            </a:schemeClr>
+          </a:solidFill>
+          <a:ln w="15875">
             <a:solidFill>
               <a:schemeClr val="accent1">
-                <a:lumMod val="40000"/>
-                <a:lumOff val="60000"/>
-                <a:alpha val="50000"/>
+                <a:lumMod val="75000"/>
               </a:schemeClr>
             </a:solidFill>
-            <a:ln w="19050">
-              <a:solidFill>
-                <a:schemeClr val="accent1">
-                  <a:lumMod val="75000"/>
-                </a:schemeClr>
-              </a:solidFill>
-            </a:ln>
-          </p:spPr>
-          <p:style>
-            <a:lnRef idx="0">
-              <a:scrgbClr r="0" g="0" b="0"/>
-            </a:lnRef>
-            <a:fillRef idx="0">
-              <a:scrgbClr r="0" g="0" b="0"/>
-            </a:fillRef>
-            <a:effectRef idx="0">
-              <a:scrgbClr r="0" g="0" b="0"/>
-            </a:effectRef>
-            <a:fontRef idx="minor">
-              <a:schemeClr val="lt1"/>
-            </a:fontRef>
-          </p:style>
-          <p:txBody>
-            <a:bodyPr rtlCol="0" anchor="ctr"/>
-            <a:lstStyle/>
-            <a:p>
-              <a:pPr algn="ctr"/>
-              <a:r>
-                <a:rPr lang="en-US" sz="960" dirty="0">
-                  <a:solidFill>
-                    <a:schemeClr val="tx2">
-                      <a:lumMod val="90000"/>
-                      <a:lumOff val="10000"/>
-                    </a:schemeClr>
-                  </a:solidFill>
-                  <a:latin typeface="Aptos" panose="020B0004020202020204" pitchFamily="34" charset="0"/>
-                </a:rPr>
-                <a:t>Visualizer</a:t>
-              </a:r>
-              <a:endParaRPr lang="vi-VN" sz="560" dirty="0">
+          </a:ln>
+        </p:spPr>
+        <p:style>
+          <a:lnRef idx="0">
+            <a:scrgbClr r="0" g="0" b="0"/>
+          </a:lnRef>
+          <a:fillRef idx="0">
+            <a:scrgbClr r="0" g="0" b="0"/>
+          </a:fillRef>
+          <a:effectRef idx="0">
+            <a:scrgbClr r="0" g="0" b="0"/>
+          </a:effectRef>
+          <a:fontRef idx="minor">
+            <a:schemeClr val="lt1"/>
+          </a:fontRef>
+        </p:style>
+        <p:txBody>
+          <a:bodyPr rtlCol="0" anchor="ctr"/>
+          <a:lstStyle/>
+          <a:p>
+            <a:pPr algn="ctr"/>
+            <a:r>
+              <a:rPr lang="en-US" sz="1000" dirty="0">
                 <a:solidFill>
-                  <a:schemeClr val="tx2">
-                    <a:lumMod val="90000"/>
-                    <a:lumOff val="10000"/>
-                  </a:schemeClr>
+                  <a:srgbClr val="102D48"/>
                 </a:solidFill>
                 <a:latin typeface="Aptos" panose="020B0004020202020204" pitchFamily="34" charset="0"/>
-              </a:endParaRPr>
-            </a:p>
-          </p:txBody>
-        </p:sp>
-        <p:sp>
-          <p:nvSpPr>
-            <p:cNvPr id="47" name="Rectangle 46">
-              <a:extLst>
-                <a:ext uri="{FF2B5EF4-FFF2-40B4-BE49-F238E27FC236}">
-                  <a16:creationId xmlns:a16="http://schemas.microsoft.com/office/drawing/2014/main" id="{2D7877F9-2B14-63EC-D386-FDBF2F9244CF}"/>
-                </a:ext>
-              </a:extLst>
-            </p:cNvPr>
-            <p:cNvSpPr/>
-            <p:nvPr/>
-          </p:nvSpPr>
-          <p:spPr>
-            <a:xfrm>
-              <a:off x="4909734" y="5360945"/>
-              <a:ext cx="1627328" cy="459363"/>
-            </a:xfrm>
-            <a:prstGeom prst="rect">
-              <a:avLst/>
-            </a:prstGeom>
+              </a:rPr>
+              <a:t>Visualizer</a:t>
+            </a:r>
+            <a:endParaRPr lang="vi-VN" sz="1000" dirty="0">
+              <a:solidFill>
+                <a:srgbClr val="102D48"/>
+              </a:solidFill>
+              <a:latin typeface="Aptos" panose="020B0004020202020204" pitchFamily="34" charset="0"/>
+            </a:endParaRPr>
+          </a:p>
+        </p:txBody>
+      </p:sp>
+      <p:sp>
+        <p:nvSpPr>
+          <p:cNvPr id="47" name="Rectangle 46">
+            <a:extLst>
+              <a:ext uri="{FF2B5EF4-FFF2-40B4-BE49-F238E27FC236}">
+                <a16:creationId xmlns:a16="http://schemas.microsoft.com/office/drawing/2014/main" id="{2D7877F9-2B14-63EC-D386-FDBF2F9244CF}"/>
+              </a:ext>
+            </a:extLst>
+          </p:cNvPr>
+          <p:cNvSpPr/>
+          <p:nvPr/>
+        </p:nvSpPr>
+        <p:spPr>
+          <a:xfrm>
+            <a:off x="3923978" y="4259871"/>
+            <a:ext cx="1157554" cy="254413"/>
+          </a:xfrm>
+          <a:prstGeom prst="rect">
+            <a:avLst/>
+          </a:prstGeom>
+          <a:solidFill>
+            <a:schemeClr val="accent1">
+              <a:lumMod val="40000"/>
+              <a:lumOff val="60000"/>
+              <a:alpha val="26000"/>
+            </a:schemeClr>
+          </a:solidFill>
+          <a:ln w="15875">
             <a:solidFill>
               <a:schemeClr val="accent1">
-                <a:lumMod val="40000"/>
-                <a:lumOff val="60000"/>
-                <a:alpha val="50000"/>
+                <a:lumMod val="75000"/>
               </a:schemeClr>
             </a:solidFill>
-            <a:ln w="19050">
-              <a:solidFill>
-                <a:schemeClr val="accent1">
-                  <a:lumMod val="75000"/>
-                </a:schemeClr>
-              </a:solidFill>
-            </a:ln>
-          </p:spPr>
-          <p:style>
-            <a:lnRef idx="0">
-              <a:scrgbClr r="0" g="0" b="0"/>
-            </a:lnRef>
-            <a:fillRef idx="0">
-              <a:scrgbClr r="0" g="0" b="0"/>
-            </a:fillRef>
-            <a:effectRef idx="0">
-              <a:scrgbClr r="0" g="0" b="0"/>
-            </a:effectRef>
-            <a:fontRef idx="minor">
-              <a:schemeClr val="lt1"/>
-            </a:fontRef>
-          </p:style>
-          <p:txBody>
-            <a:bodyPr rtlCol="0" anchor="ctr"/>
-            <a:lstStyle/>
-            <a:p>
-              <a:pPr algn="ctr"/>
-              <a:r>
-                <a:rPr lang="en-US" sz="920" dirty="0">
-                  <a:solidFill>
-                    <a:schemeClr val="tx2">
-                      <a:lumMod val="90000"/>
-                      <a:lumOff val="10000"/>
-                    </a:schemeClr>
-                  </a:solidFill>
-                  <a:latin typeface="Aptos" panose="020B0004020202020204" pitchFamily="34" charset="0"/>
-                </a:rPr>
-                <a:t>Statistics</a:t>
-              </a:r>
-              <a:endParaRPr lang="vi-VN" sz="920" dirty="0">
+          </a:ln>
+        </p:spPr>
+        <p:style>
+          <a:lnRef idx="0">
+            <a:scrgbClr r="0" g="0" b="0"/>
+          </a:lnRef>
+          <a:fillRef idx="0">
+            <a:scrgbClr r="0" g="0" b="0"/>
+          </a:fillRef>
+          <a:effectRef idx="0">
+            <a:scrgbClr r="0" g="0" b="0"/>
+          </a:effectRef>
+          <a:fontRef idx="minor">
+            <a:schemeClr val="lt1"/>
+          </a:fontRef>
+        </p:style>
+        <p:txBody>
+          <a:bodyPr rtlCol="0" anchor="ctr"/>
+          <a:lstStyle/>
+          <a:p>
+            <a:pPr algn="ctr"/>
+            <a:r>
+              <a:rPr lang="en-US" sz="1000" dirty="0">
                 <a:solidFill>
-                  <a:schemeClr val="tx2">
-                    <a:lumMod val="90000"/>
-                    <a:lumOff val="10000"/>
-                  </a:schemeClr>
+                  <a:srgbClr val="102D48"/>
                 </a:solidFill>
                 <a:latin typeface="Aptos" panose="020B0004020202020204" pitchFamily="34" charset="0"/>
-              </a:endParaRPr>
-            </a:p>
-          </p:txBody>
-        </p:sp>
-      </p:grpSp>
+              </a:rPr>
+              <a:t>Statistics</a:t>
+            </a:r>
+            <a:endParaRPr lang="vi-VN" sz="1000" dirty="0">
+              <a:solidFill>
+                <a:srgbClr val="102D48"/>
+              </a:solidFill>
+              <a:latin typeface="Aptos" panose="020B0004020202020204" pitchFamily="34" charset="0"/>
+            </a:endParaRPr>
+          </a:p>
+        </p:txBody>
+      </p:sp>
     </p:spTree>
     <p:extLst>
       <p:ext uri="{BB962C8B-B14F-4D97-AF65-F5344CB8AC3E}">

</xml_diff>